<commit_message>
Felix ist so hotttttttt omg ich voll den Crush auf den ❤️❤️❤️😍😍😍🌭😡❤️😚😊
</commit_message>
<xml_diff>
--- a/Präsentation/Pyduino_Präsentation.pptx
+++ b/Präsentation/Pyduino_Präsentation.pptx
@@ -22,6 +22,7 @@
     <p:sldId id="267" r:id="rId16"/>
     <p:sldId id="268" r:id="rId17"/>
     <p:sldId id="269" r:id="rId18"/>
+    <p:sldId id="273" r:id="rId19"/>
   </p:sldIdLst>
   <p:sldSz cx="12192000" cy="6858000"/>
   <p:notesSz cx="6858000" cy="9144000"/>
@@ -275,7 +276,7 @@
           <a:p>
             <a:fld id="{57C2ADC8-E08E-42BC-8B3F-BEE8B0D2554E}" type="datetimeFigureOut">
               <a:rPr lang="de-DE" smtClean="0"/>
-              <a:t>26.02.2023</a:t>
+              <a:t>27.02.2023</a:t>
             </a:fld>
             <a:endParaRPr lang="de-DE"/>
           </a:p>
@@ -473,7 +474,7 @@
           <a:p>
             <a:fld id="{57C2ADC8-E08E-42BC-8B3F-BEE8B0D2554E}" type="datetimeFigureOut">
               <a:rPr lang="de-DE" smtClean="0"/>
-              <a:t>26.02.2023</a:t>
+              <a:t>27.02.2023</a:t>
             </a:fld>
             <a:endParaRPr lang="de-DE"/>
           </a:p>
@@ -681,7 +682,7 @@
           <a:p>
             <a:fld id="{57C2ADC8-E08E-42BC-8B3F-BEE8B0D2554E}" type="datetimeFigureOut">
               <a:rPr lang="de-DE" smtClean="0"/>
-              <a:t>26.02.2023</a:t>
+              <a:t>27.02.2023</a:t>
             </a:fld>
             <a:endParaRPr lang="de-DE"/>
           </a:p>
@@ -879,7 +880,7 @@
           <a:p>
             <a:fld id="{57C2ADC8-E08E-42BC-8B3F-BEE8B0D2554E}" type="datetimeFigureOut">
               <a:rPr lang="de-DE" smtClean="0"/>
-              <a:t>26.02.2023</a:t>
+              <a:t>27.02.2023</a:t>
             </a:fld>
             <a:endParaRPr lang="de-DE"/>
           </a:p>
@@ -1154,7 +1155,7 @@
           <a:p>
             <a:fld id="{57C2ADC8-E08E-42BC-8B3F-BEE8B0D2554E}" type="datetimeFigureOut">
               <a:rPr lang="de-DE" smtClean="0"/>
-              <a:t>26.02.2023</a:t>
+              <a:t>27.02.2023</a:t>
             </a:fld>
             <a:endParaRPr lang="de-DE"/>
           </a:p>
@@ -1419,7 +1420,7 @@
           <a:p>
             <a:fld id="{57C2ADC8-E08E-42BC-8B3F-BEE8B0D2554E}" type="datetimeFigureOut">
               <a:rPr lang="de-DE" smtClean="0"/>
-              <a:t>26.02.2023</a:t>
+              <a:t>27.02.2023</a:t>
             </a:fld>
             <a:endParaRPr lang="de-DE"/>
           </a:p>
@@ -1831,7 +1832,7 @@
           <a:p>
             <a:fld id="{57C2ADC8-E08E-42BC-8B3F-BEE8B0D2554E}" type="datetimeFigureOut">
               <a:rPr lang="de-DE" smtClean="0"/>
-              <a:t>26.02.2023</a:t>
+              <a:t>27.02.2023</a:t>
             </a:fld>
             <a:endParaRPr lang="de-DE"/>
           </a:p>
@@ -1972,7 +1973,7 @@
           <a:p>
             <a:fld id="{57C2ADC8-E08E-42BC-8B3F-BEE8B0D2554E}" type="datetimeFigureOut">
               <a:rPr lang="de-DE" smtClean="0"/>
-              <a:t>26.02.2023</a:t>
+              <a:t>27.02.2023</a:t>
             </a:fld>
             <a:endParaRPr lang="de-DE"/>
           </a:p>
@@ -2085,7 +2086,7 @@
           <a:p>
             <a:fld id="{57C2ADC8-E08E-42BC-8B3F-BEE8B0D2554E}" type="datetimeFigureOut">
               <a:rPr lang="de-DE" smtClean="0"/>
-              <a:t>26.02.2023</a:t>
+              <a:t>27.02.2023</a:t>
             </a:fld>
             <a:endParaRPr lang="de-DE"/>
           </a:p>
@@ -2396,7 +2397,7 @@
           <a:p>
             <a:fld id="{57C2ADC8-E08E-42BC-8B3F-BEE8B0D2554E}" type="datetimeFigureOut">
               <a:rPr lang="de-DE" smtClean="0"/>
-              <a:t>26.02.2023</a:t>
+              <a:t>27.02.2023</a:t>
             </a:fld>
             <a:endParaRPr lang="de-DE"/>
           </a:p>
@@ -2684,7 +2685,7 @@
           <a:p>
             <a:fld id="{57C2ADC8-E08E-42BC-8B3F-BEE8B0D2554E}" type="datetimeFigureOut">
               <a:rPr lang="de-DE" smtClean="0"/>
-              <a:t>26.02.2023</a:t>
+              <a:t>27.02.2023</a:t>
             </a:fld>
             <a:endParaRPr lang="de-DE"/>
           </a:p>
@@ -2925,7 +2926,7 @@
           <a:p>
             <a:fld id="{57C2ADC8-E08E-42BC-8B3F-BEE8B0D2554E}" type="datetimeFigureOut">
               <a:rPr lang="de-DE" smtClean="0"/>
-              <a:t>26.02.2023</a:t>
+              <a:t>27.02.2023</a:t>
             </a:fld>
             <a:endParaRPr lang="de-DE"/>
           </a:p>
@@ -7774,6 +7775,245 @@
 </p:sld>
 </file>
 
+<file path=ppt/slides/slide18.xml><?xml version="1.0" encoding="utf-8"?>
+<p:sld xmlns:a="http://schemas.openxmlformats.org/drawingml/2006/main" xmlns:r="http://schemas.openxmlformats.org/officeDocument/2006/relationships" xmlns:p="http://schemas.openxmlformats.org/presentationml/2006/main">
+  <p:cSld>
+    <p:bg>
+      <p:bgPr>
+        <a:solidFill>
+          <a:srgbClr val="2B2B2B"/>
+        </a:solidFill>
+        <a:effectLst/>
+      </p:bgPr>
+    </p:bg>
+    <p:spTree>
+      <p:nvGrpSpPr>
+        <p:cNvPr id="1" name=""/>
+        <p:cNvGrpSpPr/>
+        <p:nvPr/>
+      </p:nvGrpSpPr>
+      <p:grpSpPr>
+        <a:xfrm>
+          <a:off x="0" y="0"/>
+          <a:ext cx="0" cy="0"/>
+          <a:chOff x="0" y="0"/>
+          <a:chExt cx="0" cy="0"/>
+        </a:xfrm>
+      </p:grpSpPr>
+      <p:sp>
+        <p:nvSpPr>
+          <p:cNvPr id="2" name="Titel 1">
+            <a:extLst>
+              <a:ext uri="{FF2B5EF4-FFF2-40B4-BE49-F238E27FC236}">
+                <a16:creationId xmlns:a16="http://schemas.microsoft.com/office/drawing/2014/main" id="{FBCFB6EF-4632-6F9B-6E43-F2A43DC08005}"/>
+              </a:ext>
+            </a:extLst>
+          </p:cNvPr>
+          <p:cNvSpPr>
+            <a:spLocks noGrp="1"/>
+          </p:cNvSpPr>
+          <p:nvPr>
+            <p:ph type="title"/>
+          </p:nvPr>
+        </p:nvSpPr>
+        <p:spPr/>
+        <p:txBody>
+          <a:bodyPr/>
+          <a:lstStyle/>
+          <a:p>
+            <a:r>
+              <a:rPr lang="de-DE" dirty="0">
+                <a:solidFill>
+                  <a:schemeClr val="bg1"/>
+                </a:solidFill>
+              </a:rPr>
+              <a:t>Ausblick</a:t>
+            </a:r>
+          </a:p>
+        </p:txBody>
+      </p:sp>
+      <p:sp>
+        <p:nvSpPr>
+          <p:cNvPr id="3" name="Inhaltsplatzhalter 2">
+            <a:extLst>
+              <a:ext uri="{FF2B5EF4-FFF2-40B4-BE49-F238E27FC236}">
+                <a16:creationId xmlns:a16="http://schemas.microsoft.com/office/drawing/2014/main" id="{4B49AF34-D785-351C-0741-87B27049BA88}"/>
+              </a:ext>
+            </a:extLst>
+          </p:cNvPr>
+          <p:cNvSpPr>
+            <a:spLocks noGrp="1"/>
+          </p:cNvSpPr>
+          <p:nvPr>
+            <p:ph idx="1"/>
+          </p:nvPr>
+        </p:nvSpPr>
+        <p:spPr/>
+        <p:txBody>
+          <a:bodyPr/>
+          <a:lstStyle/>
+          <a:p>
+            <a:r>
+              <a:rPr lang="de-DE" dirty="0">
+                <a:solidFill>
+                  <a:schemeClr val="bg1"/>
+                </a:solidFill>
+              </a:rPr>
+              <a:t>Mehr Features:</a:t>
+            </a:r>
+          </a:p>
+          <a:p>
+            <a:pPr lvl="1"/>
+            <a:r>
+              <a:rPr lang="de-DE" dirty="0">
+                <a:solidFill>
+                  <a:schemeClr val="bg1"/>
+                </a:solidFill>
+              </a:rPr>
+              <a:t>Datentypen (z.B. Listen etc.)</a:t>
+            </a:r>
+          </a:p>
+          <a:p>
+            <a:pPr lvl="1"/>
+            <a:r>
+              <a:rPr lang="de-DE" dirty="0">
+                <a:solidFill>
+                  <a:schemeClr val="bg1"/>
+                </a:solidFill>
+              </a:rPr>
+              <a:t>Features von Python und Arduino (z.B. Builtins)</a:t>
+            </a:r>
+          </a:p>
+          <a:p>
+            <a:pPr lvl="1"/>
+            <a:r>
+              <a:rPr lang="de-DE" dirty="0">
+                <a:solidFill>
+                  <a:schemeClr val="bg1"/>
+                </a:solidFill>
+              </a:rPr>
+              <a:t>Objektorientierung (Klassen, Vererbung)</a:t>
+            </a:r>
+          </a:p>
+          <a:p>
+            <a:pPr lvl="1"/>
+            <a:r>
+              <a:rPr lang="de-DE" dirty="0">
+                <a:solidFill>
+                  <a:schemeClr val="bg1"/>
+                </a:solidFill>
+              </a:rPr>
+              <a:t>Asynchrone Anfragen und Funktionsaufrufe</a:t>
+            </a:r>
+          </a:p>
+          <a:p>
+            <a:r>
+              <a:rPr lang="de-DE" dirty="0">
+                <a:solidFill>
+                  <a:schemeClr val="bg1"/>
+                </a:solidFill>
+              </a:rPr>
+              <a:t>Optimierung von </a:t>
+            </a:r>
+            <a:r>
+              <a:rPr lang="de-DE" dirty="0" err="1">
+                <a:solidFill>
+                  <a:schemeClr val="bg1"/>
+                </a:solidFill>
+              </a:rPr>
+              <a:t>Compilieren</a:t>
+            </a:r>
+            <a:r>
+              <a:rPr lang="de-DE" dirty="0">
+                <a:solidFill>
+                  <a:schemeClr val="bg1"/>
+                </a:solidFill>
+              </a:rPr>
+              <a:t> und hochladen</a:t>
+            </a:r>
+          </a:p>
+          <a:p>
+            <a:r>
+              <a:rPr lang="de-DE" dirty="0">
+                <a:solidFill>
+                  <a:schemeClr val="bg1"/>
+                </a:solidFill>
+              </a:rPr>
+              <a:t>Linux support</a:t>
+            </a:r>
+          </a:p>
+          <a:p>
+            <a:r>
+              <a:rPr lang="de-DE" dirty="0">
+                <a:solidFill>
+                  <a:schemeClr val="bg1"/>
+                </a:solidFill>
+              </a:rPr>
+              <a:t>Eigene IDE</a:t>
+            </a:r>
+          </a:p>
+          <a:p>
+            <a:endParaRPr lang="de-DE" dirty="0">
+              <a:solidFill>
+                <a:schemeClr val="bg1"/>
+              </a:solidFill>
+            </a:endParaRPr>
+          </a:p>
+          <a:p>
+            <a:endParaRPr lang="de-DE" dirty="0">
+              <a:solidFill>
+                <a:schemeClr val="bg1"/>
+              </a:solidFill>
+            </a:endParaRPr>
+          </a:p>
+          <a:p>
+            <a:pPr lvl="1"/>
+            <a:endParaRPr lang="de-DE" dirty="0">
+              <a:solidFill>
+                <a:schemeClr val="bg1"/>
+              </a:solidFill>
+            </a:endParaRPr>
+          </a:p>
+          <a:p>
+            <a:pPr lvl="1"/>
+            <a:endParaRPr lang="de-DE" dirty="0">
+              <a:solidFill>
+                <a:schemeClr val="bg1"/>
+              </a:solidFill>
+            </a:endParaRPr>
+          </a:p>
+          <a:p>
+            <a:pPr marL="457200" lvl="1" indent="0">
+              <a:buNone/>
+            </a:pPr>
+            <a:endParaRPr lang="de-DE" dirty="0">
+              <a:solidFill>
+                <a:schemeClr val="bg1"/>
+              </a:solidFill>
+            </a:endParaRPr>
+          </a:p>
+          <a:p>
+            <a:endParaRPr lang="de-DE" dirty="0">
+              <a:solidFill>
+                <a:schemeClr val="bg1"/>
+              </a:solidFill>
+            </a:endParaRPr>
+          </a:p>
+        </p:txBody>
+      </p:sp>
+    </p:spTree>
+    <p:extLst>
+      <p:ext uri="{BB962C8B-B14F-4D97-AF65-F5344CB8AC3E}">
+        <p14:creationId xmlns:p14="http://schemas.microsoft.com/office/powerpoint/2010/main" val="868426615"/>
+      </p:ext>
+    </p:extLst>
+  </p:cSld>
+  <p:clrMapOvr>
+    <a:masterClrMapping/>
+  </p:clrMapOvr>
+</p:sld>
+</file>
+
 <file path=ppt/slides/slide2.xml><?xml version="1.0" encoding="utf-8"?>
 <p:sld xmlns:a="http://schemas.openxmlformats.org/drawingml/2006/main" xmlns:r="http://schemas.openxmlformats.org/officeDocument/2006/relationships" xmlns:p="http://schemas.openxmlformats.org/presentationml/2006/main">
   <p:cSld>
@@ -7813,16 +8053,15 @@
           </p:cNvPicPr>
           <p:nvPr/>
         </p:nvPicPr>
-        <p:blipFill>
+        <p:blipFill rotWithShape="1">
           <a:blip r:embed="rId2"/>
-          <a:stretch>
-            <a:fillRect/>
-          </a:stretch>
+          <a:srcRect l="796" t="2629" r="1"/>
+          <a:stretch/>
         </p:blipFill>
         <p:spPr>
           <a:xfrm>
-            <a:off x="3207769" y="2049660"/>
-            <a:ext cx="5776461" cy="2758679"/>
+            <a:off x="3253740" y="2122170"/>
+            <a:ext cx="5730490" cy="2686169"/>
           </a:xfrm>
           <a:prstGeom prst="rect">
             <a:avLst/>

</xml_diff>